<commit_message>
Powerpoint presentation and our To-Do list for the presentation
</commit_message>
<xml_diff>
--- a/Misc/groupgame presentation.pptx
+++ b/Misc/groupgame presentation.pptx
@@ -112,6 +112,11 @@
       </a:defRPr>
     </a:lvl9pPr>
   </p:defaultTextStyle>
+  <p:extLst>
+    <p:ext uri="{EFAFB233-063F-42B5-8137-9DF3F51BA10A}">
+      <p15:sldGuideLst xmlns:p15="http://schemas.microsoft.com/office/powerpoint/2012/main"/>
+    </p:ext>
+  </p:extLst>
 </p:presentation>
 </file>
 
@@ -618,7 +623,7 @@
             <a:fld id="{B61BEF0D-F0BB-DE4B-95CE-6DB70DBA9567}" type="datetimeFigureOut">
               <a:rPr lang="en-US" dirty="0"/>
               <a:pPr/>
-              <a:t>10/20/15</a:t>
+              <a:t>10/21/15</a:t>
             </a:fld>
             <a:endParaRPr lang="en-US" dirty="0"/>
           </a:p>
@@ -911,7 +916,7 @@
             <a:fld id="{B61BEF0D-F0BB-DE4B-95CE-6DB70DBA9567}" type="datetimeFigureOut">
               <a:rPr lang="en-US" dirty="0"/>
               <a:pPr/>
-              <a:t>10/20/15</a:t>
+              <a:t>10/21/15</a:t>
             </a:fld>
             <a:endParaRPr lang="en-US" dirty="0"/>
           </a:p>
@@ -1156,7 +1161,7 @@
             <a:fld id="{B61BEF0D-F0BB-DE4B-95CE-6DB70DBA9567}" type="datetimeFigureOut">
               <a:rPr lang="en-US" dirty="0"/>
               <a:pPr/>
-              <a:t>10/20/15</a:t>
+              <a:t>10/21/15</a:t>
             </a:fld>
             <a:endParaRPr lang="en-US" dirty="0"/>
           </a:p>
@@ -1693,7 +1698,7 @@
             <a:fld id="{B61BEF0D-F0BB-DE4B-95CE-6DB70DBA9567}" type="datetimeFigureOut">
               <a:rPr lang="en-US" dirty="0"/>
               <a:pPr/>
-              <a:t>10/20/15</a:t>
+              <a:t>10/21/15</a:t>
             </a:fld>
             <a:endParaRPr lang="en-US" dirty="0"/>
           </a:p>
@@ -1938,7 +1943,7 @@
             <a:fld id="{B61BEF0D-F0BB-DE4B-95CE-6DB70DBA9567}" type="datetimeFigureOut">
               <a:rPr lang="en-US" dirty="0"/>
               <a:pPr/>
-              <a:t>10/20/15</a:t>
+              <a:t>10/21/15</a:t>
             </a:fld>
             <a:endParaRPr lang="en-US" dirty="0"/>
           </a:p>
@@ -2467,7 +2472,7 @@
             <a:fld id="{B61BEF0D-F0BB-DE4B-95CE-6DB70DBA9567}" type="datetimeFigureOut">
               <a:rPr lang="en-US" dirty="0"/>
               <a:pPr/>
-              <a:t>10/20/15</a:t>
+              <a:t>10/21/15</a:t>
             </a:fld>
             <a:endParaRPr lang="en-US" dirty="0"/>
           </a:p>
@@ -2761,7 +2766,7 @@
             <a:fld id="{B61BEF0D-F0BB-DE4B-95CE-6DB70DBA9567}" type="datetimeFigureOut">
               <a:rPr lang="en-US" dirty="0"/>
               <a:pPr/>
-              <a:t>10/20/15</a:t>
+              <a:t>10/21/15</a:t>
             </a:fld>
             <a:endParaRPr lang="en-US" dirty="0"/>
           </a:p>
@@ -2932,7 +2937,7 @@
             <a:fld id="{B61BEF0D-F0BB-DE4B-95CE-6DB70DBA9567}" type="datetimeFigureOut">
               <a:rPr lang="en-US" dirty="0"/>
               <a:pPr/>
-              <a:t>10/20/15</a:t>
+              <a:t>10/21/15</a:t>
             </a:fld>
             <a:endParaRPr lang="en-US" dirty="0"/>
           </a:p>
@@ -3109,7 +3114,7 @@
             <a:fld id="{B61BEF0D-F0BB-DE4B-95CE-6DB70DBA9567}" type="datetimeFigureOut">
               <a:rPr lang="en-US" dirty="0"/>
               <a:pPr/>
-              <a:t>10/20/15</a:t>
+              <a:t>10/21/15</a:t>
             </a:fld>
             <a:endParaRPr lang="en-US" dirty="0"/>
           </a:p>
@@ -3276,7 +3281,7 @@
             <a:fld id="{B61BEF0D-F0BB-DE4B-95CE-6DB70DBA9567}" type="datetimeFigureOut">
               <a:rPr lang="en-US" dirty="0"/>
               <a:pPr/>
-              <a:t>10/20/15</a:t>
+              <a:t>10/21/15</a:t>
             </a:fld>
             <a:endParaRPr lang="en-US" dirty="0"/>
           </a:p>
@@ -3524,7 +3529,7 @@
             <a:fld id="{B61BEF0D-F0BB-DE4B-95CE-6DB70DBA9567}" type="datetimeFigureOut">
               <a:rPr lang="en-US" dirty="0"/>
               <a:pPr/>
-              <a:t>10/20/15</a:t>
+              <a:t>10/21/15</a:t>
             </a:fld>
             <a:endParaRPr lang="en-US" dirty="0"/>
           </a:p>
@@ -3818,7 +3823,7 @@
             <a:fld id="{B61BEF0D-F0BB-DE4B-95CE-6DB70DBA9567}" type="datetimeFigureOut">
               <a:rPr lang="en-US" dirty="0"/>
               <a:pPr/>
-              <a:t>10/20/15</a:t>
+              <a:t>10/21/15</a:t>
             </a:fld>
             <a:endParaRPr lang="en-US" dirty="0"/>
           </a:p>
@@ -4257,7 +4262,7 @@
             <a:fld id="{B61BEF0D-F0BB-DE4B-95CE-6DB70DBA9567}" type="datetimeFigureOut">
               <a:rPr lang="en-US" dirty="0"/>
               <a:pPr/>
-              <a:t>10/20/15</a:t>
+              <a:t>10/21/15</a:t>
             </a:fld>
             <a:endParaRPr lang="en-US" dirty="0"/>
           </a:p>
@@ -4372,7 +4377,7 @@
             <a:fld id="{B61BEF0D-F0BB-DE4B-95CE-6DB70DBA9567}" type="datetimeFigureOut">
               <a:rPr lang="en-US" dirty="0"/>
               <a:pPr/>
-              <a:t>10/20/15</a:t>
+              <a:t>10/21/15</a:t>
             </a:fld>
             <a:endParaRPr lang="en-US" dirty="0"/>
           </a:p>
@@ -4464,7 +4469,7 @@
             <a:fld id="{B61BEF0D-F0BB-DE4B-95CE-6DB70DBA9567}" type="datetimeFigureOut">
               <a:rPr lang="en-US" dirty="0"/>
               <a:pPr/>
-              <a:t>10/20/15</a:t>
+              <a:t>10/21/15</a:t>
             </a:fld>
             <a:endParaRPr lang="en-US" dirty="0"/>
           </a:p>
@@ -4744,7 +4749,7 @@
             <a:fld id="{B61BEF0D-F0BB-DE4B-95CE-6DB70DBA9567}" type="datetimeFigureOut">
               <a:rPr lang="en-US" dirty="0"/>
               <a:pPr/>
-              <a:t>10/20/15</a:t>
+              <a:t>10/21/15</a:t>
             </a:fld>
             <a:endParaRPr lang="en-US" dirty="0"/>
           </a:p>
@@ -5032,7 +5037,7 @@
             <a:fld id="{B61BEF0D-F0BB-DE4B-95CE-6DB70DBA9567}" type="datetimeFigureOut">
               <a:rPr lang="en-US" dirty="0"/>
               <a:pPr/>
-              <a:t>10/20/15</a:t>
+              <a:t>10/21/15</a:t>
             </a:fld>
             <a:endParaRPr lang="en-US" dirty="0"/>
           </a:p>
@@ -5559,7 +5564,7 @@
             <a:fld id="{B61BEF0D-F0BB-DE4B-95CE-6DB70DBA9567}" type="datetimeFigureOut">
               <a:rPr lang="en-US" dirty="0"/>
               <a:pPr/>
-              <a:t>10/20/15</a:t>
+              <a:t>10/21/15</a:t>
             </a:fld>
             <a:endParaRPr lang="en-US" dirty="0"/>
           </a:p>
@@ -6105,7 +6110,7 @@
           <a:p>
             <a:r>
               <a:rPr lang="en-US" sz="4800" dirty="0" smtClean="0"/>
-              <a:t>“INSERT GAME NAME HERE”</a:t>
+              <a:t>BC CLARENCE</a:t>
             </a:r>
             <a:endParaRPr lang="en-US" sz="4800" dirty="0"/>
           </a:p>
@@ -6128,7 +6133,19 @@
           <a:p>
             <a:r>
               <a:rPr lang="en-US" dirty="0" smtClean="0"/>
-              <a:t>“Insert game description here”</a:t>
+              <a:t>“Sci-Fi Thriller in deep space against The </a:t>
+            </a:r>
+            <a:r>
+              <a:rPr lang="en-US" b="1" dirty="0"/>
+              <a:t>M</a:t>
+            </a:r>
+            <a:r>
+              <a:rPr lang="en-US" b="1" dirty="0" smtClean="0"/>
+              <a:t>ighty</a:t>
+            </a:r>
+            <a:r>
+              <a:rPr lang="en-US" dirty="0" smtClean="0"/>
+              <a:t> Kirill”</a:t>
             </a:r>
             <a:endParaRPr lang="en-US" dirty="0"/>
           </a:p>
@@ -6144,6 +6161,13 @@
   <p:clrMapOvr>
     <a:masterClrMapping/>
   </p:clrMapOvr>
+  <p:timing>
+    <p:tnLst>
+      <p:par>
+        <p:cTn id="1" dur="indefinite" restart="never" nodeType="tmRoot"/>
+      </p:par>
+    </p:tnLst>
+  </p:timing>
 </p:sld>
 </file>
 
@@ -6181,7 +6205,11 @@
           <a:p>
             <a:r>
               <a:rPr lang="en-US" dirty="0" smtClean="0"/>
-              <a:t>Why play “Game name” ?</a:t>
+              <a:t>Why play </a:t>
+            </a:r>
+            <a:r>
+              <a:rPr lang="en-US" dirty="0" smtClean="0"/>
+              <a:t>BC Clarence?</a:t>
             </a:r>
             <a:endParaRPr lang="en-US" dirty="0"/>
           </a:p>
@@ -6251,6 +6279,13 @@
   <p:clrMapOvr>
     <a:masterClrMapping/>
   </p:clrMapOvr>
+  <p:timing>
+    <p:tnLst>
+      <p:par>
+        <p:cTn id="1" dur="indefinite" restart="never" nodeType="tmRoot"/>
+      </p:par>
+    </p:tnLst>
+  </p:timing>
 </p:sld>
 </file>
 
@@ -6319,13 +6354,13 @@
         </p:nvSpPr>
         <p:spPr>
           <a:xfrm>
-            <a:off x="1484310" y="2666999"/>
-            <a:ext cx="10707690" cy="4061347"/>
+            <a:off x="1484310" y="2101755"/>
+            <a:ext cx="10707690" cy="4626591"/>
           </a:xfrm>
         </p:spPr>
         <p:txBody>
           <a:bodyPr>
-            <a:normAutofit lnSpcReduction="10000"/>
+            <a:normAutofit fontScale="92500" lnSpcReduction="20000"/>
           </a:bodyPr>
           <a:lstStyle/>
           <a:p>
@@ -6375,13 +6410,62 @@
             </a:r>
             <a:r>
               <a:rPr lang="en-US" dirty="0" smtClean="0"/>
-              <a:t>- Scan Objects to analyze more information about them.</a:t>
+              <a:t>- Scan Objects to analyze more information about them</a:t>
+            </a:r>
+            <a:r>
+              <a:rPr lang="en-US" dirty="0" smtClean="0"/>
+              <a:t>.</a:t>
+            </a:r>
+          </a:p>
+          <a:p>
+            <a:r>
+              <a:rPr lang="en-US" dirty="0" smtClean="0"/>
+              <a:t>Save/Load Functions</a:t>
+            </a:r>
+          </a:p>
+          <a:p>
+            <a:r>
+              <a:rPr lang="en-US" dirty="0" smtClean="0"/>
+              <a:t>User commands </a:t>
             </a:r>
           </a:p>
           <a:p>
             <a:pPr marL="0" indent="0">
               <a:buNone/>
             </a:pPr>
+            <a:r>
+              <a:rPr lang="en-US" dirty="0"/>
+              <a:t>	</a:t>
+            </a:r>
+            <a:r>
+              <a:rPr lang="en-US" dirty="0" smtClean="0"/>
+              <a:t>- </a:t>
+            </a:r>
+            <a:r>
+              <a:rPr lang="en-US" dirty="0" smtClean="0"/>
+              <a:t>(Multiple worded commands filtered into 2 words (</a:t>
+            </a:r>
+            <a:r>
+              <a:rPr lang="en-US" dirty="0" err="1" smtClean="0"/>
+              <a:t>take_coffee</a:t>
+            </a:r>
+            <a:r>
+              <a:rPr lang="en-US" dirty="0" smtClean="0"/>
+              <a:t>).</a:t>
+            </a:r>
+          </a:p>
+          <a:p>
+            <a:pPr marL="0" indent="0">
+              <a:buNone/>
+            </a:pPr>
+            <a:r>
+              <a:rPr lang="en-US" dirty="0"/>
+              <a:t>	</a:t>
+            </a:r>
+            <a:r>
+              <a:rPr lang="en-US" dirty="0" smtClean="0"/>
+              <a:t>- Multiple outputs to the user if command cannot be executed. </a:t>
+            </a:r>
             <a:r>
               <a:rPr lang="en-US" dirty="0"/>
               <a:t>	</a:t>
@@ -6399,6 +6483,13 @@
   <p:clrMapOvr>
     <a:masterClrMapping/>
   </p:clrMapOvr>
+  <p:timing>
+    <p:tnLst>
+      <p:par>
+        <p:cTn id="1" dur="indefinite" restart="never" nodeType="tmRoot"/>
+      </p:par>
+    </p:tnLst>
+  </p:timing>
 </p:sld>
 </file>
 
@@ -6469,6 +6560,13 @@
   <p:clrMapOvr>
     <a:masterClrMapping/>
   </p:clrMapOvr>
+  <p:timing>
+    <p:tnLst>
+      <p:par>
+        <p:cTn id="1" dur="indefinite" restart="never" nodeType="tmRoot"/>
+      </p:par>
+    </p:tnLst>
+  </p:timing>
 </p:sld>
 </file>
 
@@ -6621,6 +6719,13 @@
   <p:clrMapOvr>
     <a:masterClrMapping/>
   </p:clrMapOvr>
+  <p:timing>
+    <p:tnLst>
+      <p:par>
+        <p:cTn id="1" dur="indefinite" restart="never" nodeType="tmRoot"/>
+      </p:par>
+    </p:tnLst>
+  </p:timing>
 </p:sld>
 </file>
 
@@ -6743,6 +6848,13 @@
   <p:clrMapOvr>
     <a:masterClrMapping/>
   </p:clrMapOvr>
+  <p:timing>
+    <p:tnLst>
+      <p:par>
+        <p:cTn id="1" dur="indefinite" restart="never" nodeType="tmRoot"/>
+      </p:par>
+    </p:tnLst>
+  </p:timing>
 </p:sld>
 </file>
 
@@ -6880,6 +6992,13 @@
   <p:clrMapOvr>
     <a:masterClrMapping/>
   </p:clrMapOvr>
+  <p:timing>
+    <p:tnLst>
+      <p:par>
+        <p:cTn id="1" dur="indefinite" restart="never" nodeType="tmRoot"/>
+      </p:par>
+    </p:tnLst>
+  </p:timing>
 </p:sld>
 </file>
 
@@ -7020,6 +7139,13 @@
   <p:clrMapOvr>
     <a:masterClrMapping/>
   </p:clrMapOvr>
+  <p:timing>
+    <p:tnLst>
+      <p:par>
+        <p:cTn id="1" dur="indefinite" restart="never" nodeType="tmRoot"/>
+      </p:par>
+    </p:tnLst>
+  </p:timing>
 </p:sld>
 </file>
 
@@ -7121,6 +7247,13 @@
   <p:clrMapOvr>
     <a:masterClrMapping/>
   </p:clrMapOvr>
+  <p:timing>
+    <p:tnLst>
+      <p:par>
+        <p:cTn id="1" dur="indefinite" restart="never" nodeType="tmRoot"/>
+      </p:par>
+    </p:tnLst>
+  </p:timing>
 </p:sld>
 </file>
 

</xml_diff>